<commit_message>
Spacy del i pptx
</commit_message>
<xml_diff>
--- a/documentation/Grupp 3.pptx
+++ b/documentation/Grupp 3.pptx
@@ -9,8 +9,9 @@
     <p:sldId id="257" r:id="rId3"/>
     <p:sldId id="258" r:id="rId4"/>
     <p:sldId id="259" r:id="rId5"/>
-    <p:sldId id="260" r:id="rId6"/>
-    <p:sldId id="261" r:id="rId7"/>
+    <p:sldId id="262" r:id="rId6"/>
+    <p:sldId id="260" r:id="rId7"/>
+    <p:sldId id="261" r:id="rId8"/>
   </p:sldIdLst>
   <p:sldSz cx="12192000" cy="6858000"/>
   <p:notesSz cx="6858000" cy="9144000"/>
@@ -347,7 +348,7 @@
             <a:fld id="{B61BEF0D-F0BB-DE4B-95CE-6DB70DBA9567}" type="datetimeFigureOut">
               <a:rPr lang="en-US" dirty="0"/>
               <a:pPr/>
-              <a:t>6/7/2021</a:t>
+              <a:t>6/8/2021</a:t>
             </a:fld>
             <a:endParaRPr lang="en-US" dirty="0"/>
           </a:p>
@@ -678,7 +679,7 @@
             <a:fld id="{B61BEF0D-F0BB-DE4B-95CE-6DB70DBA9567}" type="datetimeFigureOut">
               <a:rPr lang="en-US" dirty="0"/>
               <a:pPr/>
-              <a:t>6/7/2021</a:t>
+              <a:t>6/8/2021</a:t>
             </a:fld>
             <a:endParaRPr lang="en-US" dirty="0"/>
           </a:p>
@@ -953,7 +954,7 @@
             <a:fld id="{B61BEF0D-F0BB-DE4B-95CE-6DB70DBA9567}" type="datetimeFigureOut">
               <a:rPr lang="en-US" dirty="0"/>
               <a:pPr/>
-              <a:t>6/7/2021</a:t>
+              <a:t>6/8/2021</a:t>
             </a:fld>
             <a:endParaRPr lang="en-US" dirty="0"/>
           </a:p>
@@ -1518,7 +1519,7 @@
             <a:fld id="{B61BEF0D-F0BB-DE4B-95CE-6DB70DBA9567}" type="datetimeFigureOut">
               <a:rPr lang="en-US" dirty="0"/>
               <a:pPr/>
-              <a:t>6/7/2021</a:t>
+              <a:t>6/8/2021</a:t>
             </a:fld>
             <a:endParaRPr lang="en-US" dirty="0"/>
           </a:p>
@@ -1793,7 +1794,7 @@
             <a:fld id="{B61BEF0D-F0BB-DE4B-95CE-6DB70DBA9567}" type="datetimeFigureOut">
               <a:rPr lang="en-US" dirty="0"/>
               <a:pPr/>
-              <a:t>6/7/2021</a:t>
+              <a:t>6/8/2021</a:t>
             </a:fld>
             <a:endParaRPr lang="en-US" dirty="0"/>
           </a:p>
@@ -2352,7 +2353,7 @@
             <a:fld id="{B61BEF0D-F0BB-DE4B-95CE-6DB70DBA9567}" type="datetimeFigureOut">
               <a:rPr lang="en-US" dirty="0"/>
               <a:pPr/>
-              <a:t>6/7/2021</a:t>
+              <a:t>6/8/2021</a:t>
             </a:fld>
             <a:endParaRPr lang="en-US" dirty="0"/>
           </a:p>
@@ -2676,7 +2677,7 @@
             <a:fld id="{B61BEF0D-F0BB-DE4B-95CE-6DB70DBA9567}" type="datetimeFigureOut">
               <a:rPr lang="en-US" dirty="0"/>
               <a:pPr/>
-              <a:t>6/7/2021</a:t>
+              <a:t>6/8/2021</a:t>
             </a:fld>
             <a:endParaRPr lang="en-US" dirty="0"/>
           </a:p>
@@ -2850,7 +2851,7 @@
             <a:fld id="{B61BEF0D-F0BB-DE4B-95CE-6DB70DBA9567}" type="datetimeFigureOut">
               <a:rPr lang="en-US" dirty="0"/>
               <a:pPr/>
-              <a:t>6/7/2021</a:t>
+              <a:t>6/8/2021</a:t>
             </a:fld>
             <a:endParaRPr lang="en-US" dirty="0"/>
           </a:p>
@@ -3085,7 +3086,7 @@
             <a:fld id="{B61BEF0D-F0BB-DE4B-95CE-6DB70DBA9567}" type="datetimeFigureOut">
               <a:rPr lang="en-US" dirty="0"/>
               <a:pPr/>
-              <a:t>6/7/2021</a:t>
+              <a:t>6/8/2021</a:t>
             </a:fld>
             <a:endParaRPr lang="en-US" dirty="0"/>
           </a:p>
@@ -3282,7 +3283,7 @@
             <a:fld id="{B61BEF0D-F0BB-DE4B-95CE-6DB70DBA9567}" type="datetimeFigureOut">
               <a:rPr lang="en-US" dirty="0"/>
               <a:pPr/>
-              <a:t>6/7/2021</a:t>
+              <a:t>6/8/2021</a:t>
             </a:fld>
             <a:endParaRPr lang="en-US" dirty="0"/>
           </a:p>
@@ -3555,7 +3556,7 @@
             <a:fld id="{B61BEF0D-F0BB-DE4B-95CE-6DB70DBA9567}" type="datetimeFigureOut">
               <a:rPr lang="en-US" dirty="0"/>
               <a:pPr/>
-              <a:t>6/7/2021</a:t>
+              <a:t>6/8/2021</a:t>
             </a:fld>
             <a:endParaRPr lang="en-US" dirty="0"/>
           </a:p>
@@ -3818,7 +3819,7 @@
             <a:fld id="{B61BEF0D-F0BB-DE4B-95CE-6DB70DBA9567}" type="datetimeFigureOut">
               <a:rPr lang="en-US" dirty="0"/>
               <a:pPr/>
-              <a:t>6/7/2021</a:t>
+              <a:t>6/8/2021</a:t>
             </a:fld>
             <a:endParaRPr lang="en-US" dirty="0"/>
           </a:p>
@@ -4189,7 +4190,7 @@
             <a:fld id="{B61BEF0D-F0BB-DE4B-95CE-6DB70DBA9567}" type="datetimeFigureOut">
               <a:rPr lang="en-US" dirty="0"/>
               <a:pPr/>
-              <a:t>6/7/2021</a:t>
+              <a:t>6/8/2021</a:t>
             </a:fld>
             <a:endParaRPr lang="en-US" dirty="0"/>
           </a:p>
@@ -4334,7 +4335,7 @@
             <a:fld id="{B61BEF0D-F0BB-DE4B-95CE-6DB70DBA9567}" type="datetimeFigureOut">
               <a:rPr lang="en-US" dirty="0"/>
               <a:pPr/>
-              <a:t>6/7/2021</a:t>
+              <a:t>6/8/2021</a:t>
             </a:fld>
             <a:endParaRPr lang="en-US" dirty="0"/>
           </a:p>
@@ -4456,7 +4457,7 @@
             <a:fld id="{B61BEF0D-F0BB-DE4B-95CE-6DB70DBA9567}" type="datetimeFigureOut">
               <a:rPr lang="en-US" dirty="0"/>
               <a:pPr/>
-              <a:t>6/7/2021</a:t>
+              <a:t>6/8/2021</a:t>
             </a:fld>
             <a:endParaRPr lang="en-US" dirty="0"/>
           </a:p>
@@ -4738,7 +4739,7 @@
             <a:fld id="{B61BEF0D-F0BB-DE4B-95CE-6DB70DBA9567}" type="datetimeFigureOut">
               <a:rPr lang="en-US" dirty="0"/>
               <a:pPr/>
-              <a:t>6/7/2021</a:t>
+              <a:t>6/8/2021</a:t>
             </a:fld>
             <a:endParaRPr lang="en-US" dirty="0"/>
           </a:p>
@@ -5059,7 +5060,7 @@
             <a:fld id="{B61BEF0D-F0BB-DE4B-95CE-6DB70DBA9567}" type="datetimeFigureOut">
               <a:rPr lang="en-US" dirty="0"/>
               <a:pPr/>
-              <a:t>6/7/2021</a:t>
+              <a:t>6/8/2021</a:t>
             </a:fld>
             <a:endParaRPr lang="en-US" dirty="0"/>
           </a:p>
@@ -5270,7 +5271,7 @@
             <a:fld id="{B61BEF0D-F0BB-DE4B-95CE-6DB70DBA9567}" type="datetimeFigureOut">
               <a:rPr lang="en-US" dirty="0"/>
               <a:pPr/>
-              <a:t>6/7/2021</a:t>
+              <a:t>6/8/2021</a:t>
             </a:fld>
             <a:endParaRPr lang="en-US" dirty="0"/>
           </a:p>
@@ -6096,9 +6097,16 @@
             <p:ph type="title"/>
           </p:nvPr>
         </p:nvSpPr>
-        <p:spPr/>
-        <p:txBody>
-          <a:bodyPr/>
+        <p:spPr>
+          <a:xfrm>
+            <a:off x="998708" y="385864"/>
+            <a:ext cx="9820071" cy="586902"/>
+          </a:xfrm>
+        </p:spPr>
+        <p:txBody>
+          <a:bodyPr>
+            <a:normAutofit fontScale="90000"/>
+          </a:bodyPr>
           <a:lstStyle/>
           <a:p>
             <a:pPr algn="ctr"/>
@@ -6117,37 +6125,626 @@
           </a:p>
         </p:txBody>
       </p:sp>
-      <p:sp>
-        <p:nvSpPr>
-          <p:cNvPr id="3" name="Platshållare för innehåll 2">
+      <p:graphicFrame>
+        <p:nvGraphicFramePr>
+          <p:cNvPr id="6" name="Tabell 9">
             <a:extLst>
               <a:ext uri="{FF2B5EF4-FFF2-40B4-BE49-F238E27FC236}">
-                <a16:creationId xmlns:a16="http://schemas.microsoft.com/office/drawing/2014/main" id="{5D14E52F-E36D-4868-B807-E1F3D09D9B1F}"/>
+                <a16:creationId xmlns:a16="http://schemas.microsoft.com/office/drawing/2014/main" id="{A1F67E0D-C7F1-4866-A1A1-45DCAC446870}"/>
               </a:ext>
             </a:extLst>
           </p:cNvPr>
-          <p:cNvSpPr>
-            <a:spLocks noGrp="1"/>
-          </p:cNvSpPr>
-          <p:nvPr>
-            <p:ph idx="1"/>
-          </p:nvPr>
-        </p:nvSpPr>
-        <p:spPr/>
-        <p:txBody>
-          <a:bodyPr/>
-          <a:lstStyle/>
-          <a:p>
-            <a:r>
-              <a:rPr lang="sv-SE" dirty="0"/>
-              <a:t>Text preprocessing</a:t>
-            </a:r>
-          </a:p>
-          <a:p>
-            <a:r>
-              <a:rPr lang="sv-SE" dirty="0"/>
-              <a:t>Robert fyller på med innehåll</a:t>
-            </a:r>
+          <p:cNvGraphicFramePr>
+            <a:graphicFrameLocks noGrp="1"/>
+          </p:cNvGraphicFramePr>
+          <p:nvPr>
+            <p:extLst>
+              <p:ext uri="{D42A27DB-BD31-4B8C-83A1-F6EECF244321}">
+                <p14:modId xmlns:p14="http://schemas.microsoft.com/office/powerpoint/2010/main" val="1557224132"/>
+              </p:ext>
+            </p:extLst>
+          </p:nvPr>
+        </p:nvGraphicFramePr>
+        <p:xfrm>
+          <a:off x="925750" y="1655758"/>
+          <a:ext cx="10340500" cy="2286000"/>
+        </p:xfrm>
+        <a:graphic>
+          <a:graphicData uri="http://schemas.openxmlformats.org/drawingml/2006/table">
+            <a:tbl>
+              <a:tblPr firstRow="1" bandRow="1">
+                <a:tableStyleId>{5C22544A-7EE6-4342-B048-85BDC9FD1C3A}</a:tableStyleId>
+              </a:tblPr>
+              <a:tblGrid>
+                <a:gridCol w="2068100">
+                  <a:extLst>
+                    <a:ext uri="{9D8B030D-6E8A-4147-A177-3AD203B41FA5}">
+                      <a16:colId xmlns:a16="http://schemas.microsoft.com/office/drawing/2014/main" val="1745288957"/>
+                    </a:ext>
+                  </a:extLst>
+                </a:gridCol>
+                <a:gridCol w="2068100">
+                  <a:extLst>
+                    <a:ext uri="{9D8B030D-6E8A-4147-A177-3AD203B41FA5}">
+                      <a16:colId xmlns:a16="http://schemas.microsoft.com/office/drawing/2014/main" val="3596749631"/>
+                    </a:ext>
+                  </a:extLst>
+                </a:gridCol>
+                <a:gridCol w="2068100">
+                  <a:extLst>
+                    <a:ext uri="{9D8B030D-6E8A-4147-A177-3AD203B41FA5}">
+                      <a16:colId xmlns:a16="http://schemas.microsoft.com/office/drawing/2014/main" val="3728665841"/>
+                    </a:ext>
+                  </a:extLst>
+                </a:gridCol>
+                <a:gridCol w="2068100">
+                  <a:extLst>
+                    <a:ext uri="{9D8B030D-6E8A-4147-A177-3AD203B41FA5}">
+                      <a16:colId xmlns:a16="http://schemas.microsoft.com/office/drawing/2014/main" val="2210708442"/>
+                    </a:ext>
+                  </a:extLst>
+                </a:gridCol>
+                <a:gridCol w="2068100">
+                  <a:extLst>
+                    <a:ext uri="{9D8B030D-6E8A-4147-A177-3AD203B41FA5}">
+                      <a16:colId xmlns:a16="http://schemas.microsoft.com/office/drawing/2014/main" val="4122421081"/>
+                    </a:ext>
+                  </a:extLst>
+                </a:gridCol>
+              </a:tblGrid>
+              <a:tr h="298424">
+                <a:tc>
+                  <a:txBody>
+                    <a:bodyPr/>
+                    <a:lstStyle/>
+                    <a:p>
+                      <a:r>
+                        <a:rPr lang="sv-SE" dirty="0"/>
+                        <a:t>Input</a:t>
+                      </a:r>
+                    </a:p>
+                  </a:txBody>
+                  <a:tcPr/>
+                </a:tc>
+                <a:tc>
+                  <a:txBody>
+                    <a:bodyPr/>
+                    <a:lstStyle/>
+                    <a:p>
+                      <a:endParaRPr lang="sv-SE" dirty="0"/>
+                    </a:p>
+                  </a:txBody>
+                  <a:tcPr/>
+                </a:tc>
+                <a:tc>
+                  <a:txBody>
+                    <a:bodyPr/>
+                    <a:lstStyle/>
+                    <a:p>
+                      <a:r>
+                        <a:rPr lang="sv-SE" dirty="0"/>
+                        <a:t>Metod</a:t>
+                      </a:r>
+                    </a:p>
+                  </a:txBody>
+                  <a:tcPr/>
+                </a:tc>
+                <a:tc>
+                  <a:txBody>
+                    <a:bodyPr/>
+                    <a:lstStyle/>
+                    <a:p>
+                      <a:endParaRPr lang="sv-SE" dirty="0"/>
+                    </a:p>
+                  </a:txBody>
+                  <a:tcPr/>
+                </a:tc>
+                <a:tc>
+                  <a:txBody>
+                    <a:bodyPr/>
+                    <a:lstStyle/>
+                    <a:p>
+                      <a:r>
+                        <a:rPr lang="sv-SE" dirty="0"/>
+                        <a:t>Output</a:t>
+                      </a:r>
+                    </a:p>
+                  </a:txBody>
+                  <a:tcPr/>
+                </a:tc>
+                <a:extLst>
+                  <a:ext uri="{0D108BD9-81ED-4DB2-BD59-A6C34878D82A}">
+                    <a16:rowId xmlns:a16="http://schemas.microsoft.com/office/drawing/2014/main" val="436001981"/>
+                  </a:ext>
+                </a:extLst>
+              </a:tr>
+              <a:tr h="522242">
+                <a:tc>
+                  <a:txBody>
+                    <a:bodyPr/>
+                    <a:lstStyle/>
+                    <a:p>
+                      <a:pPr marL="0" marR="0" lvl="0" indent="0" algn="l" defTabSz="457200" rtl="0" eaLnBrk="1" fontAlgn="auto" latinLnBrk="0" hangingPunct="1">
+                        <a:lnSpc>
+                          <a:spcPct val="100000"/>
+                        </a:lnSpc>
+                        <a:spcBef>
+                          <a:spcPts val="0"/>
+                        </a:spcBef>
+                        <a:spcAft>
+                          <a:spcPts val="0"/>
+                        </a:spcAft>
+                        <a:buClrTx/>
+                        <a:buSzTx/>
+                        <a:buFontTx/>
+                        <a:buNone/>
+                        <a:tabLst/>
+                        <a:defRPr/>
+                      </a:pPr>
+                      <a:r>
+                        <a:rPr lang="sv-SE" dirty="0" err="1"/>
+                        <a:t>söktext</a:t>
+                      </a:r>
+                      <a:r>
+                        <a:rPr lang="sv-SE" dirty="0"/>
+                        <a:t> / artikeltext</a:t>
+                      </a:r>
+                    </a:p>
+                    <a:p>
+                      <a:endParaRPr lang="sv-SE" dirty="0"/>
+                    </a:p>
+                  </a:txBody>
+                  <a:tcPr/>
+                </a:tc>
+                <a:tc>
+                  <a:txBody>
+                    <a:bodyPr/>
+                    <a:lstStyle/>
+                    <a:p>
+                      <a:pPr algn="ctr"/>
+                      <a:r>
+                        <a:rPr lang="sv-SE" dirty="0">
+                          <a:sym typeface="Wingdings" panose="05000000000000000000" pitchFamily="2" charset="2"/>
+                        </a:rPr>
+                        <a:t></a:t>
+                      </a:r>
+                      <a:endParaRPr lang="sv-SE" dirty="0"/>
+                    </a:p>
+                  </a:txBody>
+                  <a:tcPr/>
+                </a:tc>
+                <a:tc>
+                  <a:txBody>
+                    <a:bodyPr/>
+                    <a:lstStyle/>
+                    <a:p>
+                      <a:r>
+                        <a:rPr lang="sv-SE" dirty="0"/>
+                        <a:t>pre-</a:t>
+                      </a:r>
+                      <a:r>
+                        <a:rPr lang="sv-SE" dirty="0" err="1"/>
+                        <a:t>processing</a:t>
+                      </a:r>
+                      <a:endParaRPr lang="sv-SE" dirty="0"/>
+                    </a:p>
+                  </a:txBody>
+                  <a:tcPr/>
+                </a:tc>
+                <a:tc>
+                  <a:txBody>
+                    <a:bodyPr/>
+                    <a:lstStyle/>
+                    <a:p>
+                      <a:pPr marL="0" marR="0" lvl="0" indent="0" algn="ctr" defTabSz="457200" rtl="0" eaLnBrk="1" fontAlgn="auto" latinLnBrk="0" hangingPunct="1">
+                        <a:lnSpc>
+                          <a:spcPct val="100000"/>
+                        </a:lnSpc>
+                        <a:spcBef>
+                          <a:spcPts val="0"/>
+                        </a:spcBef>
+                        <a:spcAft>
+                          <a:spcPts val="0"/>
+                        </a:spcAft>
+                        <a:buClrTx/>
+                        <a:buSzTx/>
+                        <a:buFontTx/>
+                        <a:buNone/>
+                        <a:tabLst/>
+                        <a:defRPr/>
+                      </a:pPr>
+                      <a:r>
+                        <a:rPr lang="sv-SE" dirty="0">
+                          <a:sym typeface="Wingdings" panose="05000000000000000000" pitchFamily="2" charset="2"/>
+                        </a:rPr>
+                        <a:t></a:t>
+                      </a:r>
+                      <a:endParaRPr lang="sv-SE" dirty="0"/>
+                    </a:p>
+                    <a:p>
+                      <a:pPr algn="ctr"/>
+                      <a:endParaRPr lang="sv-SE" dirty="0"/>
+                    </a:p>
+                  </a:txBody>
+                  <a:tcPr/>
+                </a:tc>
+                <a:tc>
+                  <a:txBody>
+                    <a:bodyPr/>
+                    <a:lstStyle/>
+                    <a:p>
+                      <a:r>
+                        <a:rPr lang="sv-SE" dirty="0" err="1"/>
+                        <a:t>tokentree</a:t>
+                      </a:r>
+                      <a:endParaRPr lang="sv-SE" dirty="0"/>
+                    </a:p>
+                  </a:txBody>
+                  <a:tcPr/>
+                </a:tc>
+                <a:extLst>
+                  <a:ext uri="{0D108BD9-81ED-4DB2-BD59-A6C34878D82A}">
+                    <a16:rowId xmlns:a16="http://schemas.microsoft.com/office/drawing/2014/main" val="3852606822"/>
+                  </a:ext>
+                </a:extLst>
+              </a:tr>
+              <a:tr h="522242">
+                <a:tc>
+                  <a:txBody>
+                    <a:bodyPr/>
+                    <a:lstStyle/>
+                    <a:p>
+                      <a:r>
+                        <a:rPr lang="sv-SE" dirty="0"/>
+                        <a:t>artikeltext</a:t>
+                      </a:r>
+                    </a:p>
+                  </a:txBody>
+                  <a:tcPr/>
+                </a:tc>
+                <a:tc>
+                  <a:txBody>
+                    <a:bodyPr/>
+                    <a:lstStyle/>
+                    <a:p>
+                      <a:pPr marL="0" marR="0" lvl="0" indent="0" algn="ctr" defTabSz="457200" rtl="0" eaLnBrk="1" fontAlgn="auto" latinLnBrk="0" hangingPunct="1">
+                        <a:lnSpc>
+                          <a:spcPct val="100000"/>
+                        </a:lnSpc>
+                        <a:spcBef>
+                          <a:spcPts val="0"/>
+                        </a:spcBef>
+                        <a:spcAft>
+                          <a:spcPts val="0"/>
+                        </a:spcAft>
+                        <a:buClrTx/>
+                        <a:buSzTx/>
+                        <a:buFontTx/>
+                        <a:buNone/>
+                        <a:tabLst/>
+                        <a:defRPr/>
+                      </a:pPr>
+                      <a:r>
+                        <a:rPr lang="sv-SE" dirty="0">
+                          <a:sym typeface="Wingdings" panose="05000000000000000000" pitchFamily="2" charset="2"/>
+                        </a:rPr>
+                        <a:t></a:t>
+                      </a:r>
+                      <a:endParaRPr lang="sv-SE" dirty="0"/>
+                    </a:p>
+                    <a:p>
+                      <a:pPr algn="ctr"/>
+                      <a:endParaRPr lang="sv-SE" dirty="0"/>
+                    </a:p>
+                  </a:txBody>
+                  <a:tcPr/>
+                </a:tc>
+                <a:tc>
+                  <a:txBody>
+                    <a:bodyPr/>
+                    <a:lstStyle/>
+                    <a:p>
+                      <a:r>
+                        <a:rPr lang="sv-SE" dirty="0" err="1"/>
+                        <a:t>summery</a:t>
+                      </a:r>
+                      <a:endParaRPr lang="sv-SE" dirty="0"/>
+                    </a:p>
+                  </a:txBody>
+                  <a:tcPr/>
+                </a:tc>
+                <a:tc>
+                  <a:txBody>
+                    <a:bodyPr/>
+                    <a:lstStyle/>
+                    <a:p>
+                      <a:pPr marL="0" marR="0" lvl="0" indent="0" algn="ctr" defTabSz="457200" rtl="0" eaLnBrk="1" fontAlgn="auto" latinLnBrk="0" hangingPunct="1">
+                        <a:lnSpc>
+                          <a:spcPct val="100000"/>
+                        </a:lnSpc>
+                        <a:spcBef>
+                          <a:spcPts val="0"/>
+                        </a:spcBef>
+                        <a:spcAft>
+                          <a:spcPts val="0"/>
+                        </a:spcAft>
+                        <a:buClrTx/>
+                        <a:buSzTx/>
+                        <a:buFontTx/>
+                        <a:buNone/>
+                        <a:tabLst/>
+                        <a:defRPr/>
+                      </a:pPr>
+                      <a:r>
+                        <a:rPr lang="sv-SE" dirty="0">
+                          <a:sym typeface="Wingdings" panose="05000000000000000000" pitchFamily="2" charset="2"/>
+                        </a:rPr>
+                        <a:t></a:t>
+                      </a:r>
+                      <a:endParaRPr lang="sv-SE" dirty="0"/>
+                    </a:p>
+                    <a:p>
+                      <a:pPr algn="ctr"/>
+                      <a:endParaRPr lang="sv-SE" dirty="0"/>
+                    </a:p>
+                  </a:txBody>
+                  <a:tcPr/>
+                </a:tc>
+                <a:tc>
+                  <a:txBody>
+                    <a:bodyPr/>
+                    <a:lstStyle/>
+                    <a:p>
+                      <a:r>
+                        <a:rPr lang="sv-SE" dirty="0"/>
+                        <a:t>10 meningar</a:t>
+                      </a:r>
+                    </a:p>
+                  </a:txBody>
+                  <a:tcPr/>
+                </a:tc>
+                <a:extLst>
+                  <a:ext uri="{0D108BD9-81ED-4DB2-BD59-A6C34878D82A}">
+                    <a16:rowId xmlns:a16="http://schemas.microsoft.com/office/drawing/2014/main" val="457963810"/>
+                  </a:ext>
+                </a:extLst>
+              </a:tr>
+              <a:tr h="522242">
+                <a:tc>
+                  <a:txBody>
+                    <a:bodyPr/>
+                    <a:lstStyle/>
+                    <a:p>
+                      <a:pPr marL="0" marR="0" lvl="0" indent="0" algn="l" defTabSz="457200" rtl="0" eaLnBrk="1" fontAlgn="auto" latinLnBrk="0" hangingPunct="1">
+                        <a:lnSpc>
+                          <a:spcPct val="100000"/>
+                        </a:lnSpc>
+                        <a:spcBef>
+                          <a:spcPts val="0"/>
+                        </a:spcBef>
+                        <a:spcAft>
+                          <a:spcPts val="0"/>
+                        </a:spcAft>
+                        <a:buClrTx/>
+                        <a:buSzTx/>
+                        <a:buFontTx/>
+                        <a:buNone/>
+                        <a:tabLst/>
+                        <a:defRPr/>
+                      </a:pPr>
+                      <a:r>
+                        <a:rPr lang="sv-SE" dirty="0" err="1"/>
+                        <a:t>söktext</a:t>
+                      </a:r>
+                      <a:r>
+                        <a:rPr lang="sv-SE" dirty="0"/>
+                        <a:t> / artikeltext</a:t>
+                      </a:r>
+                    </a:p>
+                    <a:p>
+                      <a:endParaRPr lang="sv-SE" dirty="0"/>
+                    </a:p>
+                  </a:txBody>
+                  <a:tcPr/>
+                </a:tc>
+                <a:tc>
+                  <a:txBody>
+                    <a:bodyPr/>
+                    <a:lstStyle/>
+                    <a:p>
+                      <a:pPr marL="0" marR="0" lvl="0" indent="0" algn="ctr" defTabSz="457200" rtl="0" eaLnBrk="1" fontAlgn="auto" latinLnBrk="0" hangingPunct="1">
+                        <a:lnSpc>
+                          <a:spcPct val="100000"/>
+                        </a:lnSpc>
+                        <a:spcBef>
+                          <a:spcPts val="0"/>
+                        </a:spcBef>
+                        <a:spcAft>
+                          <a:spcPts val="0"/>
+                        </a:spcAft>
+                        <a:buClrTx/>
+                        <a:buSzTx/>
+                        <a:buFontTx/>
+                        <a:buNone/>
+                        <a:tabLst/>
+                        <a:defRPr/>
+                      </a:pPr>
+                      <a:r>
+                        <a:rPr lang="sv-SE" dirty="0">
+                          <a:sym typeface="Wingdings" panose="05000000000000000000" pitchFamily="2" charset="2"/>
+                        </a:rPr>
+                        <a:t></a:t>
+                      </a:r>
+                      <a:endParaRPr lang="sv-SE" dirty="0"/>
+                    </a:p>
+                    <a:p>
+                      <a:pPr algn="ctr"/>
+                      <a:endParaRPr lang="sv-SE" dirty="0"/>
+                    </a:p>
+                  </a:txBody>
+                  <a:tcPr/>
+                </a:tc>
+                <a:tc>
+                  <a:txBody>
+                    <a:bodyPr/>
+                    <a:lstStyle/>
+                    <a:p>
+                      <a:r>
+                        <a:rPr lang="sv-SE" dirty="0"/>
+                        <a:t>match</a:t>
+                      </a:r>
+                    </a:p>
+                  </a:txBody>
+                  <a:tcPr/>
+                </a:tc>
+                <a:tc>
+                  <a:txBody>
+                    <a:bodyPr/>
+                    <a:lstStyle/>
+                    <a:p>
+                      <a:pPr marL="0" marR="0" lvl="0" indent="0" algn="ctr" defTabSz="457200" rtl="0" eaLnBrk="1" fontAlgn="auto" latinLnBrk="0" hangingPunct="1">
+                        <a:lnSpc>
+                          <a:spcPct val="100000"/>
+                        </a:lnSpc>
+                        <a:spcBef>
+                          <a:spcPts val="0"/>
+                        </a:spcBef>
+                        <a:spcAft>
+                          <a:spcPts val="0"/>
+                        </a:spcAft>
+                        <a:buClrTx/>
+                        <a:buSzTx/>
+                        <a:buFontTx/>
+                        <a:buNone/>
+                        <a:tabLst/>
+                        <a:defRPr/>
+                      </a:pPr>
+                      <a:r>
+                        <a:rPr lang="sv-SE" dirty="0">
+                          <a:sym typeface="Wingdings" panose="05000000000000000000" pitchFamily="2" charset="2"/>
+                        </a:rPr>
+                        <a:t></a:t>
+                      </a:r>
+                      <a:endParaRPr lang="sv-SE" dirty="0"/>
+                    </a:p>
+                    <a:p>
+                      <a:pPr algn="ctr"/>
+                      <a:endParaRPr lang="sv-SE" dirty="0"/>
+                    </a:p>
+                  </a:txBody>
+                  <a:tcPr/>
+                </a:tc>
+                <a:tc>
+                  <a:txBody>
+                    <a:bodyPr/>
+                    <a:lstStyle/>
+                    <a:p>
+                      <a:r>
+                        <a:rPr lang="sv-SE" dirty="0"/>
+                        <a:t>rankar </a:t>
+                      </a:r>
+                      <a:r>
+                        <a:rPr lang="sv-SE" dirty="0" err="1"/>
+                        <a:t>top</a:t>
+                      </a:r>
+                      <a:r>
+                        <a:rPr lang="sv-SE" dirty="0"/>
+                        <a:t> 5</a:t>
+                      </a:r>
+                    </a:p>
+                  </a:txBody>
+                  <a:tcPr/>
+                </a:tc>
+                <a:extLst>
+                  <a:ext uri="{0D108BD9-81ED-4DB2-BD59-A6C34878D82A}">
+                    <a16:rowId xmlns:a16="http://schemas.microsoft.com/office/drawing/2014/main" val="1424035561"/>
+                  </a:ext>
+                </a:extLst>
+              </a:tr>
+            </a:tbl>
+          </a:graphicData>
+        </a:graphic>
+      </p:graphicFrame>
+      <p:pic>
+        <p:nvPicPr>
+          <p:cNvPr id="7" name="Picture 4">
+            <a:extLst>
+              <a:ext uri="{FF2B5EF4-FFF2-40B4-BE49-F238E27FC236}">
+                <a16:creationId xmlns:a16="http://schemas.microsoft.com/office/drawing/2014/main" id="{75ABBAC8-0B86-490C-81BE-53AC40A3A48A}"/>
+              </a:ext>
+            </a:extLst>
+          </p:cNvPr>
+          <p:cNvPicPr>
+            <a:picLocks noChangeAspect="1" noChangeArrowheads="1"/>
+          </p:cNvPicPr>
+          <p:nvPr/>
+        </p:nvPicPr>
+        <p:blipFill>
+          <a:blip r:embed="rId2">
+            <a:extLst>
+              <a:ext uri="{28A0092B-C50C-407E-A947-70E740481C1C}">
+                <a14:useLocalDpi xmlns:a14="http://schemas.microsoft.com/office/drawing/2010/main" val="0"/>
+              </a:ext>
+            </a:extLst>
+          </a:blip>
+          <a:srcRect/>
+          <a:stretch>
+            <a:fillRect/>
+          </a:stretch>
+        </p:blipFill>
+        <p:spPr bwMode="auto">
+          <a:xfrm>
+            <a:off x="3814838" y="4746892"/>
+            <a:ext cx="4173191" cy="1489921"/>
+          </a:xfrm>
+          <a:prstGeom prst="rect">
+            <a:avLst/>
+          </a:prstGeom>
+          <a:noFill/>
+          <a:extLst>
+            <a:ext uri="{909E8E84-426E-40DD-AFC4-6F175D3DCCD1}">
+              <a14:hiddenFill xmlns:a14="http://schemas.microsoft.com/office/drawing/2010/main">
+                <a:solidFill>
+                  <a:srgbClr val="FFFFFF"/>
+                </a:solidFill>
+              </a14:hiddenFill>
+            </a:ext>
+          </a:extLst>
+        </p:spPr>
+      </p:pic>
+      <p:sp>
+        <p:nvSpPr>
+          <p:cNvPr id="14" name="textruta 13">
+            <a:extLst>
+              <a:ext uri="{FF2B5EF4-FFF2-40B4-BE49-F238E27FC236}">
+                <a16:creationId xmlns:a16="http://schemas.microsoft.com/office/drawing/2014/main" id="{CC3B9417-D9C0-46A6-864D-9B179EC51C18}"/>
+              </a:ext>
+            </a:extLst>
+          </p:cNvPr>
+          <p:cNvSpPr txBox="1"/>
+          <p:nvPr/>
+        </p:nvSpPr>
+        <p:spPr>
+          <a:xfrm>
+            <a:off x="3814838" y="5307187"/>
+            <a:ext cx="904673" cy="369332"/>
+          </a:xfrm>
+          <a:prstGeom prst="rect">
+            <a:avLst/>
+          </a:prstGeom>
+          <a:noFill/>
+        </p:spPr>
+        <p:txBody>
+          <a:bodyPr wrap="square" rtlCol="0">
+            <a:spAutoFit/>
+          </a:bodyPr>
+          <a:lstStyle/>
+          <a:p>
+            <a:r>
+              <a:rPr lang="sv-SE" dirty="0" err="1"/>
+              <a:t>spacy</a:t>
+            </a:r>
+            <a:endParaRPr lang="sv-SE" dirty="0"/>
           </a:p>
         </p:txBody>
       </p:sp>
@@ -6186,6 +6783,279 @@
           <p:cNvPr id="2" name="Rubrik 1">
             <a:extLst>
               <a:ext uri="{FF2B5EF4-FFF2-40B4-BE49-F238E27FC236}">
+                <a16:creationId xmlns:a16="http://schemas.microsoft.com/office/drawing/2014/main" id="{CAB8820C-29F3-46A3-879F-09C9D61D3B56}"/>
+              </a:ext>
+            </a:extLst>
+          </p:cNvPr>
+          <p:cNvSpPr>
+            <a:spLocks noGrp="1"/>
+          </p:cNvSpPr>
+          <p:nvPr>
+            <p:ph type="title"/>
+          </p:nvPr>
+        </p:nvSpPr>
+        <p:spPr>
+          <a:xfrm>
+            <a:off x="685801" y="282430"/>
+            <a:ext cx="10131425" cy="1009475"/>
+          </a:xfrm>
+        </p:spPr>
+        <p:txBody>
+          <a:bodyPr/>
+          <a:lstStyle/>
+          <a:p>
+            <a:pPr algn="ctr"/>
+            <a:r>
+              <a:rPr lang="sv-SE" sz="6000" dirty="0" err="1"/>
+              <a:t>SpaCy</a:t>
+            </a:r>
+            <a:r>
+              <a:rPr lang="sv-SE" dirty="0"/>
+              <a:t> - </a:t>
+            </a:r>
+            <a:r>
+              <a:rPr lang="sv-SE" sz="6000" dirty="0"/>
+              <a:t>NLP</a:t>
+            </a:r>
+          </a:p>
+        </p:txBody>
+      </p:sp>
+      <p:sp>
+        <p:nvSpPr>
+          <p:cNvPr id="11" name="textruta 10">
+            <a:extLst>
+              <a:ext uri="{FF2B5EF4-FFF2-40B4-BE49-F238E27FC236}">
+                <a16:creationId xmlns:a16="http://schemas.microsoft.com/office/drawing/2014/main" id="{A63DEE50-80B0-4320-90C9-7594FC480A2D}"/>
+              </a:ext>
+            </a:extLst>
+          </p:cNvPr>
+          <p:cNvSpPr txBox="1"/>
+          <p:nvPr/>
+        </p:nvSpPr>
+        <p:spPr>
+          <a:xfrm flipH="1">
+            <a:off x="1144944" y="1720840"/>
+            <a:ext cx="9876494" cy="3970318"/>
+          </a:xfrm>
+          <a:prstGeom prst="rect">
+            <a:avLst/>
+          </a:prstGeom>
+          <a:noFill/>
+        </p:spPr>
+        <p:txBody>
+          <a:bodyPr wrap="square" rtlCol="0">
+            <a:spAutoFit/>
+          </a:bodyPr>
+          <a:lstStyle/>
+          <a:p>
+            <a:r>
+              <a:rPr lang="sv-SE" u="sng" dirty="0"/>
+              <a:t>Prestanda</a:t>
+            </a:r>
+          </a:p>
+          <a:p>
+            <a:endParaRPr lang="sv-SE" dirty="0"/>
+          </a:p>
+          <a:p>
+            <a:r>
+              <a:rPr lang="sv-SE" dirty="0"/>
+              <a:t>Val av </a:t>
+            </a:r>
+            <a:r>
+              <a:rPr lang="sv-SE" dirty="0" err="1"/>
+              <a:t>Spacy</a:t>
+            </a:r>
+            <a:r>
+              <a:rPr lang="sv-SE" dirty="0"/>
+              <a:t> modell påverkar prestandan kraftigt</a:t>
+            </a:r>
+          </a:p>
+          <a:p>
+            <a:endParaRPr lang="sv-SE" dirty="0"/>
+          </a:p>
+          <a:p>
+            <a:pPr marL="285750" indent="-285750">
+              <a:buFont typeface="Arial" panose="020B0604020202020204" pitchFamily="34" charset="0"/>
+              <a:buChar char="•"/>
+            </a:pPr>
+            <a:r>
+              <a:rPr lang="sv-SE" dirty="0"/>
+              <a:t>När </a:t>
+            </a:r>
+            <a:r>
+              <a:rPr lang="sv-SE" dirty="0" err="1"/>
+              <a:t>söktext</a:t>
+            </a:r>
+            <a:r>
+              <a:rPr lang="sv-SE" dirty="0"/>
+              <a:t> eller liknande artiklar matchas används ”</a:t>
+            </a:r>
+            <a:r>
+              <a:rPr lang="sv-SE" dirty="0" err="1"/>
+              <a:t>lg</a:t>
+            </a:r>
+            <a:r>
+              <a:rPr lang="sv-SE" dirty="0"/>
+              <a:t>” modellen</a:t>
+            </a:r>
+          </a:p>
+          <a:p>
+            <a:pPr marL="285750" indent="-285750">
+              <a:buFont typeface="Arial" panose="020B0604020202020204" pitchFamily="34" charset="0"/>
+              <a:buChar char="•"/>
+            </a:pPr>
+            <a:endParaRPr lang="sv-SE" dirty="0"/>
+          </a:p>
+          <a:p>
+            <a:pPr marL="285750" indent="-285750">
+              <a:buFont typeface="Arial" panose="020B0604020202020204" pitchFamily="34" charset="0"/>
+              <a:buChar char="•"/>
+            </a:pPr>
+            <a:r>
+              <a:rPr lang="sv-SE" dirty="0"/>
+              <a:t>När </a:t>
+            </a:r>
+            <a:r>
+              <a:rPr lang="sv-SE" dirty="0" err="1"/>
+              <a:t>admin</a:t>
+            </a:r>
+            <a:r>
+              <a:rPr lang="sv-SE" dirty="0"/>
+              <a:t> lägger till artiklar i DB kan ”</a:t>
+            </a:r>
+            <a:r>
+              <a:rPr lang="sv-SE" dirty="0" err="1"/>
+              <a:t>trf</a:t>
+            </a:r>
+            <a:r>
+              <a:rPr lang="sv-SE" dirty="0"/>
+              <a:t>” modellen användas</a:t>
+            </a:r>
+          </a:p>
+          <a:p>
+            <a:pPr marL="285750" indent="-285750">
+              <a:buFont typeface="Arial" panose="020B0604020202020204" pitchFamily="34" charset="0"/>
+              <a:buChar char="•"/>
+            </a:pPr>
+            <a:endParaRPr lang="sv-SE" dirty="0"/>
+          </a:p>
+          <a:p>
+            <a:pPr marL="285750" indent="-285750">
+              <a:buFont typeface="Arial" panose="020B0604020202020204" pitchFamily="34" charset="0"/>
+              <a:buChar char="•"/>
+            </a:pPr>
+            <a:r>
+              <a:rPr lang="sv-SE" dirty="0"/>
+              <a:t>Bearbetning artikeltext är då redan gjord i DB</a:t>
+            </a:r>
+          </a:p>
+          <a:p>
+            <a:endParaRPr lang="sv-SE" dirty="0"/>
+          </a:p>
+          <a:p>
+            <a:endParaRPr lang="sv-SE" dirty="0"/>
+          </a:p>
+          <a:p>
+            <a:r>
+              <a:rPr lang="sv-SE" dirty="0"/>
+              <a:t>Om endast en viss funktionalitet behövs 	</a:t>
+            </a:r>
+            <a:r>
+              <a:rPr lang="sv-SE" dirty="0">
+                <a:sym typeface="Wingdings" panose="05000000000000000000" pitchFamily="2" charset="2"/>
+              </a:rPr>
+              <a:t> 	</a:t>
+            </a:r>
+            <a:r>
+              <a:rPr lang="sv-SE" dirty="0" err="1"/>
+              <a:t>Disable</a:t>
+            </a:r>
+            <a:r>
+              <a:rPr lang="sv-SE" dirty="0"/>
+              <a:t> </a:t>
+            </a:r>
+            <a:r>
+              <a:rPr lang="sv-SE" dirty="0" err="1"/>
+              <a:t>piplines</a:t>
+            </a:r>
+            <a:r>
+              <a:rPr lang="sv-SE" dirty="0"/>
+              <a:t>  	</a:t>
+            </a:r>
+            <a:r>
+              <a:rPr lang="sv-SE" dirty="0">
+                <a:sym typeface="Wingdings" panose="05000000000000000000" pitchFamily="2" charset="2"/>
+              </a:rPr>
+              <a:t>	 </a:t>
+            </a:r>
+            <a:r>
+              <a:rPr lang="sv-SE" dirty="0" err="1"/>
+              <a:t>doc</a:t>
+            </a:r>
+            <a:r>
+              <a:rPr lang="sv-SE" dirty="0"/>
+              <a:t> </a:t>
+            </a:r>
+            <a:r>
+              <a:rPr lang="sv-SE" dirty="0" err="1"/>
+              <a:t>obj</a:t>
+            </a:r>
+            <a:endParaRPr lang="sv-SE" dirty="0"/>
+          </a:p>
+          <a:p>
+            <a:r>
+              <a:rPr lang="sv-SE" dirty="0"/>
+              <a:t>Tex. när liknande artiklar matchas	där </a:t>
+            </a:r>
+            <a:r>
+              <a:rPr lang="sv-SE" dirty="0" err="1"/>
+              <a:t>toketrees</a:t>
+            </a:r>
+            <a:r>
+              <a:rPr lang="sv-SE" dirty="0"/>
+              <a:t> jämförs  </a:t>
+            </a:r>
+          </a:p>
+          <a:p>
+            <a:endParaRPr lang="sv-SE" dirty="0"/>
+          </a:p>
+        </p:txBody>
+      </p:sp>
+    </p:spTree>
+    <p:extLst>
+      <p:ext uri="{BB962C8B-B14F-4D97-AF65-F5344CB8AC3E}">
+        <p14:creationId xmlns:p14="http://schemas.microsoft.com/office/powerpoint/2010/main" val="4159117005"/>
+      </p:ext>
+    </p:extLst>
+  </p:cSld>
+  <p:clrMapOvr>
+    <a:masterClrMapping/>
+  </p:clrMapOvr>
+</p:sld>
+</file>
+
+<file path=ppt/slides/slide6.xml><?xml version="1.0" encoding="utf-8"?>
+<p:sld xmlns:a="http://schemas.openxmlformats.org/drawingml/2006/main" xmlns:r="http://schemas.openxmlformats.org/officeDocument/2006/relationships" xmlns:p="http://schemas.openxmlformats.org/presentationml/2006/main">
+  <p:cSld>
+    <p:spTree>
+      <p:nvGrpSpPr>
+        <p:cNvPr id="1" name=""/>
+        <p:cNvGrpSpPr/>
+        <p:nvPr/>
+      </p:nvGrpSpPr>
+      <p:grpSpPr>
+        <a:xfrm>
+          <a:off x="0" y="0"/>
+          <a:ext cx="0" cy="0"/>
+          <a:chOff x="0" y="0"/>
+          <a:chExt cx="0" cy="0"/>
+        </a:xfrm>
+      </p:grpSpPr>
+      <p:sp>
+        <p:nvSpPr>
+          <p:cNvPr id="2" name="Rubrik 1">
+            <a:extLst>
+              <a:ext uri="{FF2B5EF4-FFF2-40B4-BE49-F238E27FC236}">
                 <a16:creationId xmlns:a16="http://schemas.microsoft.com/office/drawing/2014/main" id="{65AC390F-093D-46EC-BED9-37414EE21859}"/>
               </a:ext>
             </a:extLst>
@@ -6302,7 +7172,7 @@
 </p:sld>
 </file>
 
-<file path=ppt/slides/slide6.xml><?xml version="1.0" encoding="utf-8"?>
+<file path=ppt/slides/slide7.xml><?xml version="1.0" encoding="utf-8"?>
 <p:sld xmlns:a="http://schemas.openxmlformats.org/drawingml/2006/main" xmlns:r="http://schemas.openxmlformats.org/officeDocument/2006/relationships" xmlns:p="http://schemas.openxmlformats.org/presentationml/2006/main">
   <p:cSld>
     <p:spTree>

</xml_diff>

<commit_message>
Spelling errors in pptx
</commit_message>
<xml_diff>
--- a/documentation/Grupp 3.pptx
+++ b/documentation/Grupp 3.pptx
@@ -348,7 +348,7 @@
             <a:fld id="{B61BEF0D-F0BB-DE4B-95CE-6DB70DBA9567}" type="datetimeFigureOut">
               <a:rPr lang="en-US" dirty="0"/>
               <a:pPr/>
-              <a:t>6/8/2021</a:t>
+              <a:t>6/9/2021</a:t>
             </a:fld>
             <a:endParaRPr lang="en-US" dirty="0"/>
           </a:p>
@@ -679,7 +679,7 @@
             <a:fld id="{B61BEF0D-F0BB-DE4B-95CE-6DB70DBA9567}" type="datetimeFigureOut">
               <a:rPr lang="en-US" dirty="0"/>
               <a:pPr/>
-              <a:t>6/8/2021</a:t>
+              <a:t>6/9/2021</a:t>
             </a:fld>
             <a:endParaRPr lang="en-US" dirty="0"/>
           </a:p>
@@ -954,7 +954,7 @@
             <a:fld id="{B61BEF0D-F0BB-DE4B-95CE-6DB70DBA9567}" type="datetimeFigureOut">
               <a:rPr lang="en-US" dirty="0"/>
               <a:pPr/>
-              <a:t>6/8/2021</a:t>
+              <a:t>6/9/2021</a:t>
             </a:fld>
             <a:endParaRPr lang="en-US" dirty="0"/>
           </a:p>
@@ -1519,7 +1519,7 @@
             <a:fld id="{B61BEF0D-F0BB-DE4B-95CE-6DB70DBA9567}" type="datetimeFigureOut">
               <a:rPr lang="en-US" dirty="0"/>
               <a:pPr/>
-              <a:t>6/8/2021</a:t>
+              <a:t>6/9/2021</a:t>
             </a:fld>
             <a:endParaRPr lang="en-US" dirty="0"/>
           </a:p>
@@ -1794,7 +1794,7 @@
             <a:fld id="{B61BEF0D-F0BB-DE4B-95CE-6DB70DBA9567}" type="datetimeFigureOut">
               <a:rPr lang="en-US" dirty="0"/>
               <a:pPr/>
-              <a:t>6/8/2021</a:t>
+              <a:t>6/9/2021</a:t>
             </a:fld>
             <a:endParaRPr lang="en-US" dirty="0"/>
           </a:p>
@@ -2353,7 +2353,7 @@
             <a:fld id="{B61BEF0D-F0BB-DE4B-95CE-6DB70DBA9567}" type="datetimeFigureOut">
               <a:rPr lang="en-US" dirty="0"/>
               <a:pPr/>
-              <a:t>6/8/2021</a:t>
+              <a:t>6/9/2021</a:t>
             </a:fld>
             <a:endParaRPr lang="en-US" dirty="0"/>
           </a:p>
@@ -2677,7 +2677,7 @@
             <a:fld id="{B61BEF0D-F0BB-DE4B-95CE-6DB70DBA9567}" type="datetimeFigureOut">
               <a:rPr lang="en-US" dirty="0"/>
               <a:pPr/>
-              <a:t>6/8/2021</a:t>
+              <a:t>6/9/2021</a:t>
             </a:fld>
             <a:endParaRPr lang="en-US" dirty="0"/>
           </a:p>
@@ -2851,7 +2851,7 @@
             <a:fld id="{B61BEF0D-F0BB-DE4B-95CE-6DB70DBA9567}" type="datetimeFigureOut">
               <a:rPr lang="en-US" dirty="0"/>
               <a:pPr/>
-              <a:t>6/8/2021</a:t>
+              <a:t>6/9/2021</a:t>
             </a:fld>
             <a:endParaRPr lang="en-US" dirty="0"/>
           </a:p>
@@ -3086,7 +3086,7 @@
             <a:fld id="{B61BEF0D-F0BB-DE4B-95CE-6DB70DBA9567}" type="datetimeFigureOut">
               <a:rPr lang="en-US" dirty="0"/>
               <a:pPr/>
-              <a:t>6/8/2021</a:t>
+              <a:t>6/9/2021</a:t>
             </a:fld>
             <a:endParaRPr lang="en-US" dirty="0"/>
           </a:p>
@@ -3283,7 +3283,7 @@
             <a:fld id="{B61BEF0D-F0BB-DE4B-95CE-6DB70DBA9567}" type="datetimeFigureOut">
               <a:rPr lang="en-US" dirty="0"/>
               <a:pPr/>
-              <a:t>6/8/2021</a:t>
+              <a:t>6/9/2021</a:t>
             </a:fld>
             <a:endParaRPr lang="en-US" dirty="0"/>
           </a:p>
@@ -3556,7 +3556,7 @@
             <a:fld id="{B61BEF0D-F0BB-DE4B-95CE-6DB70DBA9567}" type="datetimeFigureOut">
               <a:rPr lang="en-US" dirty="0"/>
               <a:pPr/>
-              <a:t>6/8/2021</a:t>
+              <a:t>6/9/2021</a:t>
             </a:fld>
             <a:endParaRPr lang="en-US" dirty="0"/>
           </a:p>
@@ -3819,7 +3819,7 @@
             <a:fld id="{B61BEF0D-F0BB-DE4B-95CE-6DB70DBA9567}" type="datetimeFigureOut">
               <a:rPr lang="en-US" dirty="0"/>
               <a:pPr/>
-              <a:t>6/8/2021</a:t>
+              <a:t>6/9/2021</a:t>
             </a:fld>
             <a:endParaRPr lang="en-US" dirty="0"/>
           </a:p>
@@ -4190,7 +4190,7 @@
             <a:fld id="{B61BEF0D-F0BB-DE4B-95CE-6DB70DBA9567}" type="datetimeFigureOut">
               <a:rPr lang="en-US" dirty="0"/>
               <a:pPr/>
-              <a:t>6/8/2021</a:t>
+              <a:t>6/9/2021</a:t>
             </a:fld>
             <a:endParaRPr lang="en-US" dirty="0"/>
           </a:p>
@@ -4335,7 +4335,7 @@
             <a:fld id="{B61BEF0D-F0BB-DE4B-95CE-6DB70DBA9567}" type="datetimeFigureOut">
               <a:rPr lang="en-US" dirty="0"/>
               <a:pPr/>
-              <a:t>6/8/2021</a:t>
+              <a:t>6/9/2021</a:t>
             </a:fld>
             <a:endParaRPr lang="en-US" dirty="0"/>
           </a:p>
@@ -4457,7 +4457,7 @@
             <a:fld id="{B61BEF0D-F0BB-DE4B-95CE-6DB70DBA9567}" type="datetimeFigureOut">
               <a:rPr lang="en-US" dirty="0"/>
               <a:pPr/>
-              <a:t>6/8/2021</a:t>
+              <a:t>6/9/2021</a:t>
             </a:fld>
             <a:endParaRPr lang="en-US" dirty="0"/>
           </a:p>
@@ -4739,7 +4739,7 @@
             <a:fld id="{B61BEF0D-F0BB-DE4B-95CE-6DB70DBA9567}" type="datetimeFigureOut">
               <a:rPr lang="en-US" dirty="0"/>
               <a:pPr/>
-              <a:t>6/8/2021</a:t>
+              <a:t>6/9/2021</a:t>
             </a:fld>
             <a:endParaRPr lang="en-US" dirty="0"/>
           </a:p>
@@ -5060,7 +5060,7 @@
             <a:fld id="{B61BEF0D-F0BB-DE4B-95CE-6DB70DBA9567}" type="datetimeFigureOut">
               <a:rPr lang="en-US" dirty="0"/>
               <a:pPr/>
-              <a:t>6/8/2021</a:t>
+              <a:t>6/9/2021</a:t>
             </a:fld>
             <a:endParaRPr lang="en-US" dirty="0"/>
           </a:p>
@@ -5271,7 +5271,7 @@
             <a:fld id="{B61BEF0D-F0BB-DE4B-95CE-6DB70DBA9567}" type="datetimeFigureOut">
               <a:rPr lang="en-US" dirty="0"/>
               <a:pPr/>
-              <a:t>6/8/2021</a:t>
+              <a:t>6/9/2021</a:t>
             </a:fld>
             <a:endParaRPr lang="en-US" dirty="0"/>
           </a:p>
@@ -6140,7 +6140,7 @@
           <p:nvPr>
             <p:extLst>
               <p:ext uri="{D42A27DB-BD31-4B8C-83A1-F6EECF244321}">
-                <p14:modId xmlns:p14="http://schemas.microsoft.com/office/powerpoint/2010/main" val="1557224132"/>
+                <p14:modId xmlns:p14="http://schemas.microsoft.com/office/powerpoint/2010/main" val="2941110843"/>
               </p:ext>
             </p:extLst>
           </p:nvPr>
@@ -6374,8 +6374,12 @@
                     <a:lstStyle/>
                     <a:p>
                       <a:r>
+                        <a:rPr lang="sv-SE" dirty="0"/>
+                        <a:t>token </a:t>
+                      </a:r>
+                      <a:r>
                         <a:rPr lang="sv-SE" dirty="0" err="1"/>
-                        <a:t>tokentree</a:t>
+                        <a:t>tree</a:t>
                       </a:r>
                       <a:endParaRPr lang="sv-SE" dirty="0"/>
                     </a:p>
@@ -6641,15 +6645,7 @@
                     <a:p>
                       <a:r>
                         <a:rPr lang="sv-SE" dirty="0"/>
-                        <a:t>rankar </a:t>
-                      </a:r>
-                      <a:r>
-                        <a:rPr lang="sv-SE" dirty="0" err="1"/>
-                        <a:t>top</a:t>
-                      </a:r>
-                      <a:r>
-                        <a:rPr lang="sv-SE" dirty="0"/>
-                        <a:t> 5</a:t>
+                        <a:t>rankar topp 5</a:t>
                       </a:r>
                     </a:p>
                   </a:txBody>
@@ -6880,7 +6876,7 @@
             </a:pPr>
             <a:r>
               <a:rPr lang="sv-SE" dirty="0"/>
-              <a:t>När </a:t>
+              <a:t>När en </a:t>
             </a:r>
             <a:r>
               <a:rPr lang="sv-SE" dirty="0" err="1"/>
@@ -6946,7 +6942,7 @@
             </a:pPr>
             <a:r>
               <a:rPr lang="sv-SE" dirty="0"/>
-              <a:t>Bearbetning artikeltext är då redan gjord i DB</a:t>
+              <a:t>Då är bearbetning av artikeltexten redan gjord i DB</a:t>
             </a:r>
           </a:p>
           <a:p>
@@ -7005,11 +7001,11 @@
           <a:p>
             <a:r>
               <a:rPr lang="sv-SE" dirty="0"/>
-              <a:t>Tex. när liknande artiklar matchas	där </a:t>
+              <a:t>Ex. på användning är när liknande artiklar matchas, där token </a:t>
             </a:r>
             <a:r>
               <a:rPr lang="sv-SE" dirty="0" err="1"/>
-              <a:t>toketrees</a:t>
+              <a:t>trees</a:t>
             </a:r>
             <a:r>
               <a:rPr lang="sv-SE" dirty="0"/>

</xml_diff>